<commit_message>
Add powerpoint 365 support
</commit_message>
<xml_diff>
--- a/PowerpointTemplater.Tests/files/ReplacePictures_output.pptx
+++ b/PowerpointTemplater.Tests/files/ReplacePictures_output.pptx
@@ -3105,7 +3105,7 @@
           <p:nvPr/>
         </p:nvPicPr>
         <p:blipFill>
-          <a:blip r:embed="Rd9860efed70c44c2">
+          <a:blip r:embed="R3bf476d41e0246fa">
             <a:extLst>
               <a:ext uri="{28A0092B-C50C-407E-A947-70E740481C1C}">
                 <a14:useLocalDpi xmlns:a14="http://schemas.microsoft.com/office/drawing/2010/main" val="0"/>
@@ -3135,7 +3135,7 @@
           <p:nvPr/>
         </p:nvPicPr>
         <p:blipFill>
-          <a:blip r:embed="R3ad9ad55f0074110">
+          <a:blip r:embed="R143d11148d3f4fa3">
             <a:extLst>
               <a:ext uri="{28A0092B-C50C-407E-A947-70E740481C1C}">
                 <a14:useLocalDpi xmlns:a14="http://schemas.microsoft.com/office/drawing/2010/main" val="0"/>
@@ -3165,7 +3165,7 @@
           <p:nvPr/>
         </p:nvPicPr>
         <p:blipFill>
-          <a:blip r:embed="Rd6ff4ec9e88045bb">
+          <a:blip r:embed="Ra3c620b4247e4a11">
             <a:extLst>
               <a:ext uri="{28A0092B-C50C-407E-A947-70E740481C1C}">
                 <a14:useLocalDpi xmlns:a14="http://schemas.microsoft.com/office/drawing/2010/main" val="0"/>
@@ -3195,7 +3195,7 @@
           <p:nvPr/>
         </p:nvPicPr>
         <p:blipFill>
-          <a:blip r:embed="Rf8a907ea9a554eba">
+          <a:blip r:embed="Rc5e1dddb2a8c4d6a">
             <a:extLst>
               <a:ext uri="{28A0092B-C50C-407E-A947-70E740481C1C}">
                 <a14:useLocalDpi xmlns:a14="http://schemas.microsoft.com/office/drawing/2010/main" val="0"/>
@@ -3255,7 +3255,7 @@
           <p:nvPr/>
         </p:nvPicPr>
         <p:blipFill>
-          <a:blip r:embed="R3ad9ad55f0074110">
+          <a:blip r:embed="R143d11148d3f4fa3">
             <a:extLst>
               <a:ext uri="{28A0092B-C50C-407E-A947-70E740481C1C}">
                 <a14:useLocalDpi xmlns:a14="http://schemas.microsoft.com/office/drawing/2010/main" val="0"/>
@@ -3285,7 +3285,7 @@
           <p:nvPr/>
         </p:nvPicPr>
         <p:blipFill>
-          <a:blip r:embed="Rd6ff4ec9e88045bb">
+          <a:blip r:embed="Ra3c620b4247e4a11">
             <a:extLst>
               <a:ext uri="{28A0092B-C50C-407E-A947-70E740481C1C}">
                 <a14:useLocalDpi xmlns:a14="http://schemas.microsoft.com/office/drawing/2010/main" val="0"/>
@@ -3315,7 +3315,7 @@
           <p:nvPr/>
         </p:nvPicPr>
         <p:blipFill>
-          <a:blip r:embed="Rf8a907ea9a554eba">
+          <a:blip r:embed="Rc5e1dddb2a8c4d6a">
             <a:extLst>
               <a:ext uri="{28A0092B-C50C-407E-A947-70E740481C1C}">
                 <a14:useLocalDpi xmlns:a14="http://schemas.microsoft.com/office/drawing/2010/main" val="0"/>
@@ -3375,7 +3375,7 @@
           <p:nvPr/>
         </p:nvPicPr>
         <p:blipFill>
-          <a:blip r:embed="R3ad9ad55f0074110">
+          <a:blip r:embed="R143d11148d3f4fa3">
             <a:extLst>
               <a:ext uri="{28A0092B-C50C-407E-A947-70E740481C1C}">
                 <a14:useLocalDpi xmlns:a14="http://schemas.microsoft.com/office/drawing/2010/main" val="0"/>
@@ -3405,7 +3405,7 @@
           <p:nvPr/>
         </p:nvPicPr>
         <p:blipFill>
-          <a:blip r:embed="Rd6ff4ec9e88045bb">
+          <a:blip r:embed="Ra3c620b4247e4a11">
             <a:extLst>
               <a:ext uri="{28A0092B-C50C-407E-A947-70E740481C1C}">
                 <a14:useLocalDpi xmlns:a14="http://schemas.microsoft.com/office/drawing/2010/main" val="0"/>
@@ -3435,7 +3435,7 @@
           <p:nvPr/>
         </p:nvPicPr>
         <p:blipFill>
-          <a:blip r:embed="Rf8a907ea9a554eba">
+          <a:blip r:embed="Rc5e1dddb2a8c4d6a">
             <a:extLst>
               <a:ext uri="{28A0092B-C50C-407E-A947-70E740481C1C}">
                 <a14:useLocalDpi xmlns:a14="http://schemas.microsoft.com/office/drawing/2010/main" val="0"/>
@@ -3495,7 +3495,7 @@
           <p:nvPr/>
         </p:nvPicPr>
         <p:blipFill>
-          <a:blip r:embed="R3ad9ad55f0074110">
+          <a:blip r:embed="R143d11148d3f4fa3">
             <a:extLst>
               <a:ext uri="{28A0092B-C50C-407E-A947-70E740481C1C}">
                 <a14:useLocalDpi xmlns:a14="http://schemas.microsoft.com/office/drawing/2010/main" val="0"/>
@@ -3525,7 +3525,7 @@
           <p:nvPr/>
         </p:nvPicPr>
         <p:blipFill>
-          <a:blip r:embed="Rd6ff4ec9e88045bb">
+          <a:blip r:embed="Ra3c620b4247e4a11">
             <a:extLst>
               <a:ext uri="{28A0092B-C50C-407E-A947-70E740481C1C}">
                 <a14:useLocalDpi xmlns:a14="http://schemas.microsoft.com/office/drawing/2010/main" val="0"/>
@@ -3555,7 +3555,7 @@
           <p:nvPr/>
         </p:nvPicPr>
         <p:blipFill>
-          <a:blip r:embed="Rf8a907ea9a554eba">
+          <a:blip r:embed="Rc5e1dddb2a8c4d6a">
             <a:extLst>
               <a:ext uri="{28A0092B-C50C-407E-A947-70E740481C1C}">
                 <a14:useLocalDpi xmlns:a14="http://schemas.microsoft.com/office/drawing/2010/main" val="0"/>
@@ -3686,7 +3686,7 @@
           <p:nvPr/>
         </p:nvPicPr>
         <p:blipFill>
-          <a:blip r:embed="R01540c1cece04d31">
+          <a:blip r:embed="R5ae143e654364811">
             <a:extLst>
               <a:ext uri="{28A0092B-C50C-407E-A947-70E740481C1C}">
                 <a14:useLocalDpi xmlns:a14="http://schemas.microsoft.com/office/drawing/2010/main" val="0"/>
@@ -3716,7 +3716,7 @@
           <p:nvPr/>
         </p:nvPicPr>
         <p:blipFill>
-          <a:blip r:embed="R36bcfa6c5a4849a0">
+          <a:blip r:embed="Rc90319fa11bf4c0b">
             <a:extLst>
               <a:ext uri="{28A0092B-C50C-407E-A947-70E740481C1C}">
                 <a14:useLocalDpi xmlns:a14="http://schemas.microsoft.com/office/drawing/2010/main" val="0"/>
@@ -3746,7 +3746,7 @@
           <p:nvPr/>
         </p:nvPicPr>
         <p:blipFill>
-          <a:blip r:embed="R863a528d339c4267">
+          <a:blip r:embed="R0eb005dd50574d5e">
             <a:extLst>
               <a:ext uri="{28A0092B-C50C-407E-A947-70E740481C1C}">
                 <a14:useLocalDpi xmlns:a14="http://schemas.microsoft.com/office/drawing/2010/main" val="0"/>
@@ -3776,7 +3776,7 @@
           <p:nvPr/>
         </p:nvPicPr>
         <p:blipFill>
-          <a:blip r:embed="Rd286799c78a34815">
+          <a:blip r:embed="Rba4398d8a5204166">
             <a:extLst>
               <a:ext uri="{28A0092B-C50C-407E-A947-70E740481C1C}">
                 <a14:useLocalDpi xmlns:a14="http://schemas.microsoft.com/office/drawing/2010/main" val="0"/>
@@ -3836,7 +3836,7 @@
           <p:nvPr/>
         </p:nvPicPr>
         <p:blipFill>
-          <a:blip r:embed="R36bcfa6c5a4849a0">
+          <a:blip r:embed="Rc90319fa11bf4c0b">
             <a:extLst>
               <a:ext uri="{28A0092B-C50C-407E-A947-70E740481C1C}">
                 <a14:useLocalDpi xmlns:a14="http://schemas.microsoft.com/office/drawing/2010/main" val="0"/>
@@ -3866,7 +3866,7 @@
           <p:nvPr/>
         </p:nvPicPr>
         <p:blipFill>
-          <a:blip r:embed="R863a528d339c4267">
+          <a:blip r:embed="R0eb005dd50574d5e">
             <a:extLst>
               <a:ext uri="{28A0092B-C50C-407E-A947-70E740481C1C}">
                 <a14:useLocalDpi xmlns:a14="http://schemas.microsoft.com/office/drawing/2010/main" val="0"/>
@@ -3896,7 +3896,7 @@
           <p:nvPr/>
         </p:nvPicPr>
         <p:blipFill>
-          <a:blip r:embed="Rd286799c78a34815">
+          <a:blip r:embed="Rba4398d8a5204166">
             <a:extLst>
               <a:ext uri="{28A0092B-C50C-407E-A947-70E740481C1C}">
                 <a14:useLocalDpi xmlns:a14="http://schemas.microsoft.com/office/drawing/2010/main" val="0"/>
@@ -3956,7 +3956,7 @@
           <p:nvPr/>
         </p:nvPicPr>
         <p:blipFill>
-          <a:blip r:embed="R36bcfa6c5a4849a0">
+          <a:blip r:embed="Rc90319fa11bf4c0b">
             <a:extLst>
               <a:ext uri="{28A0092B-C50C-407E-A947-70E740481C1C}">
                 <a14:useLocalDpi xmlns:a14="http://schemas.microsoft.com/office/drawing/2010/main" val="0"/>
@@ -3986,7 +3986,7 @@
           <p:nvPr/>
         </p:nvPicPr>
         <p:blipFill>
-          <a:blip r:embed="R863a528d339c4267">
+          <a:blip r:embed="R0eb005dd50574d5e">
             <a:extLst>
               <a:ext uri="{28A0092B-C50C-407E-A947-70E740481C1C}">
                 <a14:useLocalDpi xmlns:a14="http://schemas.microsoft.com/office/drawing/2010/main" val="0"/>
@@ -4016,7 +4016,7 @@
           <p:nvPr/>
         </p:nvPicPr>
         <p:blipFill>
-          <a:blip r:embed="Rd286799c78a34815">
+          <a:blip r:embed="Rba4398d8a5204166">
             <a:extLst>
               <a:ext uri="{28A0092B-C50C-407E-A947-70E740481C1C}">
                 <a14:useLocalDpi xmlns:a14="http://schemas.microsoft.com/office/drawing/2010/main" val="0"/>
@@ -4076,7 +4076,7 @@
           <p:nvPr/>
         </p:nvPicPr>
         <p:blipFill>
-          <a:blip r:embed="R36bcfa6c5a4849a0">
+          <a:blip r:embed="Rc90319fa11bf4c0b">
             <a:extLst>
               <a:ext uri="{28A0092B-C50C-407E-A947-70E740481C1C}">
                 <a14:useLocalDpi xmlns:a14="http://schemas.microsoft.com/office/drawing/2010/main" val="0"/>
@@ -4106,7 +4106,7 @@
           <p:nvPr/>
         </p:nvPicPr>
         <p:blipFill>
-          <a:blip r:embed="R863a528d339c4267">
+          <a:blip r:embed="R0eb005dd50574d5e">
             <a:extLst>
               <a:ext uri="{28A0092B-C50C-407E-A947-70E740481C1C}">
                 <a14:useLocalDpi xmlns:a14="http://schemas.microsoft.com/office/drawing/2010/main" val="0"/>
@@ -4136,7 +4136,7 @@
           <p:nvPr/>
         </p:nvPicPr>
         <p:blipFill>
-          <a:blip r:embed="Rd286799c78a34815">
+          <a:blip r:embed="Rba4398d8a5204166">
             <a:extLst>
               <a:ext uri="{28A0092B-C50C-407E-A947-70E740481C1C}">
                 <a14:useLocalDpi xmlns:a14="http://schemas.microsoft.com/office/drawing/2010/main" val="0"/>

</xml_diff>

<commit_message>
Change target framework to netstandard2.0
</commit_message>
<xml_diff>
--- a/PowerpointTemplater.Tests/files/ReplacePictures_output.pptx
+++ b/PowerpointTemplater.Tests/files/ReplacePictures_output.pptx
@@ -3105,7 +3105,7 @@
           <p:nvPr/>
         </p:nvPicPr>
         <p:blipFill>
-          <a:blip r:embed="R3bf476d41e0246fa">
+          <a:blip r:embed="R50513427fdcb44b9">
             <a:extLst>
               <a:ext uri="{28A0092B-C50C-407E-A947-70E740481C1C}">
                 <a14:useLocalDpi xmlns:a14="http://schemas.microsoft.com/office/drawing/2010/main" val="0"/>
@@ -3135,7 +3135,7 @@
           <p:nvPr/>
         </p:nvPicPr>
         <p:blipFill>
-          <a:blip r:embed="R143d11148d3f4fa3">
+          <a:blip r:embed="Rcb62095570804f48">
             <a:extLst>
               <a:ext uri="{28A0092B-C50C-407E-A947-70E740481C1C}">
                 <a14:useLocalDpi xmlns:a14="http://schemas.microsoft.com/office/drawing/2010/main" val="0"/>
@@ -3165,7 +3165,7 @@
           <p:nvPr/>
         </p:nvPicPr>
         <p:blipFill>
-          <a:blip r:embed="Ra3c620b4247e4a11">
+          <a:blip r:embed="R20f023b5c8da4a51">
             <a:extLst>
               <a:ext uri="{28A0092B-C50C-407E-A947-70E740481C1C}">
                 <a14:useLocalDpi xmlns:a14="http://schemas.microsoft.com/office/drawing/2010/main" val="0"/>
@@ -3195,7 +3195,7 @@
           <p:nvPr/>
         </p:nvPicPr>
         <p:blipFill>
-          <a:blip r:embed="Rc5e1dddb2a8c4d6a">
+          <a:blip r:embed="Re532d428a0cb4a42">
             <a:extLst>
               <a:ext uri="{28A0092B-C50C-407E-A947-70E740481C1C}">
                 <a14:useLocalDpi xmlns:a14="http://schemas.microsoft.com/office/drawing/2010/main" val="0"/>
@@ -3255,7 +3255,7 @@
           <p:nvPr/>
         </p:nvPicPr>
         <p:blipFill>
-          <a:blip r:embed="R143d11148d3f4fa3">
+          <a:blip r:embed="Rcb62095570804f48">
             <a:extLst>
               <a:ext uri="{28A0092B-C50C-407E-A947-70E740481C1C}">
                 <a14:useLocalDpi xmlns:a14="http://schemas.microsoft.com/office/drawing/2010/main" val="0"/>
@@ -3285,7 +3285,7 @@
           <p:nvPr/>
         </p:nvPicPr>
         <p:blipFill>
-          <a:blip r:embed="Ra3c620b4247e4a11">
+          <a:blip r:embed="R20f023b5c8da4a51">
             <a:extLst>
               <a:ext uri="{28A0092B-C50C-407E-A947-70E740481C1C}">
                 <a14:useLocalDpi xmlns:a14="http://schemas.microsoft.com/office/drawing/2010/main" val="0"/>
@@ -3315,7 +3315,7 @@
           <p:nvPr/>
         </p:nvPicPr>
         <p:blipFill>
-          <a:blip r:embed="Rc5e1dddb2a8c4d6a">
+          <a:blip r:embed="Re532d428a0cb4a42">
             <a:extLst>
               <a:ext uri="{28A0092B-C50C-407E-A947-70E740481C1C}">
                 <a14:useLocalDpi xmlns:a14="http://schemas.microsoft.com/office/drawing/2010/main" val="0"/>
@@ -3375,7 +3375,7 @@
           <p:nvPr/>
         </p:nvPicPr>
         <p:blipFill>
-          <a:blip r:embed="R143d11148d3f4fa3">
+          <a:blip r:embed="Rcb62095570804f48">
             <a:extLst>
               <a:ext uri="{28A0092B-C50C-407E-A947-70E740481C1C}">
                 <a14:useLocalDpi xmlns:a14="http://schemas.microsoft.com/office/drawing/2010/main" val="0"/>
@@ -3405,7 +3405,7 @@
           <p:nvPr/>
         </p:nvPicPr>
         <p:blipFill>
-          <a:blip r:embed="Ra3c620b4247e4a11">
+          <a:blip r:embed="R20f023b5c8da4a51">
             <a:extLst>
               <a:ext uri="{28A0092B-C50C-407E-A947-70E740481C1C}">
                 <a14:useLocalDpi xmlns:a14="http://schemas.microsoft.com/office/drawing/2010/main" val="0"/>
@@ -3435,7 +3435,7 @@
           <p:nvPr/>
         </p:nvPicPr>
         <p:blipFill>
-          <a:blip r:embed="Rc5e1dddb2a8c4d6a">
+          <a:blip r:embed="Re532d428a0cb4a42">
             <a:extLst>
               <a:ext uri="{28A0092B-C50C-407E-A947-70E740481C1C}">
                 <a14:useLocalDpi xmlns:a14="http://schemas.microsoft.com/office/drawing/2010/main" val="0"/>
@@ -3495,7 +3495,7 @@
           <p:nvPr/>
         </p:nvPicPr>
         <p:blipFill>
-          <a:blip r:embed="R143d11148d3f4fa3">
+          <a:blip r:embed="Rcb62095570804f48">
             <a:extLst>
               <a:ext uri="{28A0092B-C50C-407E-A947-70E740481C1C}">
                 <a14:useLocalDpi xmlns:a14="http://schemas.microsoft.com/office/drawing/2010/main" val="0"/>
@@ -3525,7 +3525,7 @@
           <p:nvPr/>
         </p:nvPicPr>
         <p:blipFill>
-          <a:blip r:embed="Ra3c620b4247e4a11">
+          <a:blip r:embed="R20f023b5c8da4a51">
             <a:extLst>
               <a:ext uri="{28A0092B-C50C-407E-A947-70E740481C1C}">
                 <a14:useLocalDpi xmlns:a14="http://schemas.microsoft.com/office/drawing/2010/main" val="0"/>
@@ -3555,7 +3555,7 @@
           <p:nvPr/>
         </p:nvPicPr>
         <p:blipFill>
-          <a:blip r:embed="Rc5e1dddb2a8c4d6a">
+          <a:blip r:embed="Re532d428a0cb4a42">
             <a:extLst>
               <a:ext uri="{28A0092B-C50C-407E-A947-70E740481C1C}">
                 <a14:useLocalDpi xmlns:a14="http://schemas.microsoft.com/office/drawing/2010/main" val="0"/>
@@ -3686,7 +3686,7 @@
           <p:nvPr/>
         </p:nvPicPr>
         <p:blipFill>
-          <a:blip r:embed="R5ae143e654364811">
+          <a:blip r:embed="R701de4dbbe654668">
             <a:extLst>
               <a:ext uri="{28A0092B-C50C-407E-A947-70E740481C1C}">
                 <a14:useLocalDpi xmlns:a14="http://schemas.microsoft.com/office/drawing/2010/main" val="0"/>
@@ -3716,7 +3716,7 @@
           <p:nvPr/>
         </p:nvPicPr>
         <p:blipFill>
-          <a:blip r:embed="Rc90319fa11bf4c0b">
+          <a:blip r:embed="Rf1a0917117694e56">
             <a:extLst>
               <a:ext uri="{28A0092B-C50C-407E-A947-70E740481C1C}">
                 <a14:useLocalDpi xmlns:a14="http://schemas.microsoft.com/office/drawing/2010/main" val="0"/>
@@ -3746,7 +3746,7 @@
           <p:nvPr/>
         </p:nvPicPr>
         <p:blipFill>
-          <a:blip r:embed="R0eb005dd50574d5e">
+          <a:blip r:embed="Rce0d4a8519d34296">
             <a:extLst>
               <a:ext uri="{28A0092B-C50C-407E-A947-70E740481C1C}">
                 <a14:useLocalDpi xmlns:a14="http://schemas.microsoft.com/office/drawing/2010/main" val="0"/>
@@ -3776,7 +3776,7 @@
           <p:nvPr/>
         </p:nvPicPr>
         <p:blipFill>
-          <a:blip r:embed="Rba4398d8a5204166">
+          <a:blip r:embed="Rae271903831f499d">
             <a:extLst>
               <a:ext uri="{28A0092B-C50C-407E-A947-70E740481C1C}">
                 <a14:useLocalDpi xmlns:a14="http://schemas.microsoft.com/office/drawing/2010/main" val="0"/>
@@ -3836,7 +3836,7 @@
           <p:nvPr/>
         </p:nvPicPr>
         <p:blipFill>
-          <a:blip r:embed="Rc90319fa11bf4c0b">
+          <a:blip r:embed="Rf1a0917117694e56">
             <a:extLst>
               <a:ext uri="{28A0092B-C50C-407E-A947-70E740481C1C}">
                 <a14:useLocalDpi xmlns:a14="http://schemas.microsoft.com/office/drawing/2010/main" val="0"/>
@@ -3866,7 +3866,7 @@
           <p:nvPr/>
         </p:nvPicPr>
         <p:blipFill>
-          <a:blip r:embed="R0eb005dd50574d5e">
+          <a:blip r:embed="Rce0d4a8519d34296">
             <a:extLst>
               <a:ext uri="{28A0092B-C50C-407E-A947-70E740481C1C}">
                 <a14:useLocalDpi xmlns:a14="http://schemas.microsoft.com/office/drawing/2010/main" val="0"/>
@@ -3896,7 +3896,7 @@
           <p:nvPr/>
         </p:nvPicPr>
         <p:blipFill>
-          <a:blip r:embed="Rba4398d8a5204166">
+          <a:blip r:embed="Rae271903831f499d">
             <a:extLst>
               <a:ext uri="{28A0092B-C50C-407E-A947-70E740481C1C}">
                 <a14:useLocalDpi xmlns:a14="http://schemas.microsoft.com/office/drawing/2010/main" val="0"/>
@@ -3956,7 +3956,7 @@
           <p:nvPr/>
         </p:nvPicPr>
         <p:blipFill>
-          <a:blip r:embed="Rc90319fa11bf4c0b">
+          <a:blip r:embed="Rf1a0917117694e56">
             <a:extLst>
               <a:ext uri="{28A0092B-C50C-407E-A947-70E740481C1C}">
                 <a14:useLocalDpi xmlns:a14="http://schemas.microsoft.com/office/drawing/2010/main" val="0"/>
@@ -3986,7 +3986,7 @@
           <p:nvPr/>
         </p:nvPicPr>
         <p:blipFill>
-          <a:blip r:embed="R0eb005dd50574d5e">
+          <a:blip r:embed="Rce0d4a8519d34296">
             <a:extLst>
               <a:ext uri="{28A0092B-C50C-407E-A947-70E740481C1C}">
                 <a14:useLocalDpi xmlns:a14="http://schemas.microsoft.com/office/drawing/2010/main" val="0"/>
@@ -4016,7 +4016,7 @@
           <p:nvPr/>
         </p:nvPicPr>
         <p:blipFill>
-          <a:blip r:embed="Rba4398d8a5204166">
+          <a:blip r:embed="Rae271903831f499d">
             <a:extLst>
               <a:ext uri="{28A0092B-C50C-407E-A947-70E740481C1C}">
                 <a14:useLocalDpi xmlns:a14="http://schemas.microsoft.com/office/drawing/2010/main" val="0"/>
@@ -4076,7 +4076,7 @@
           <p:nvPr/>
         </p:nvPicPr>
         <p:blipFill>
-          <a:blip r:embed="Rc90319fa11bf4c0b">
+          <a:blip r:embed="Rf1a0917117694e56">
             <a:extLst>
               <a:ext uri="{28A0092B-C50C-407E-A947-70E740481C1C}">
                 <a14:useLocalDpi xmlns:a14="http://schemas.microsoft.com/office/drawing/2010/main" val="0"/>
@@ -4106,7 +4106,7 @@
           <p:nvPr/>
         </p:nvPicPr>
         <p:blipFill>
-          <a:blip r:embed="R0eb005dd50574d5e">
+          <a:blip r:embed="Rce0d4a8519d34296">
             <a:extLst>
               <a:ext uri="{28A0092B-C50C-407E-A947-70E740481C1C}">
                 <a14:useLocalDpi xmlns:a14="http://schemas.microsoft.com/office/drawing/2010/main" val="0"/>
@@ -4136,7 +4136,7 @@
           <p:nvPr/>
         </p:nvPicPr>
         <p:blipFill>
-          <a:blip r:embed="Rba4398d8a5204166">
+          <a:blip r:embed="Rae271903831f499d">
             <a:extLst>
               <a:ext uri="{28A0092B-C50C-407E-A947-70E740481C1C}">
                 <a14:useLocalDpi xmlns:a14="http://schemas.microsoft.com/office/drawing/2010/main" val="0"/>

</xml_diff>